<commit_message>
update software dev teams ppt
</commit_message>
<xml_diff>
--- a/SoftwareDevTeamsLesson/Presentation.pptx
+++ b/SoftwareDevTeamsLesson/Presentation.pptx
@@ -31,21 +31,13 @@
       <p:regular r:id="rId17"/>
     </p:embeddedFont>
     <p:embeddedFont>
-      <p:font typeface="MingLiU" panose="02020509000000000000" pitchFamily="49" charset="-120"/>
+      <p:font typeface="Miriam Libre" panose="00000500000000000000" pitchFamily="2" charset="-79"/>
       <p:regular r:id="rId18"/>
-    </p:embeddedFont>
-    <p:embeddedFont>
-      <p:font typeface="Miriam Libre" panose="00000500000000000000" pitchFamily="2" charset="-79"/>
-      <p:regular r:id="rId19"/>
-      <p:bold r:id="rId20"/>
-    </p:embeddedFont>
-    <p:embeddedFont>
-      <p:font typeface="MS Mincho" panose="02020609040205080304" pitchFamily="49" charset="-128"/>
-      <p:regular r:id="rId21"/>
+      <p:bold r:id="rId19"/>
     </p:embeddedFont>
     <p:embeddedFont>
       <p:font typeface="Script MT Bold" panose="03040602040607080904" pitchFamily="66" charset="0"/>
-      <p:bold r:id="rId22"/>
+      <p:bold r:id="rId20"/>
     </p:embeddedFont>
   </p:embeddedFontLst>
   <p:defaultTextStyle>
@@ -11783,7 +11775,7 @@
               <a:rPr lang="en-US" sz="3200" dirty="0">
                 <a:latin typeface="Script MT Bold" panose="03040602040607080904" pitchFamily="66" charset="0"/>
               </a:rPr>
-              <a:t>49</a:t>
+              <a:t>19</a:t>
             </a:r>
           </a:p>
           <a:p>
@@ -11791,7 +11783,7 @@
               <a:rPr lang="en-US" sz="3200" dirty="0">
                 <a:latin typeface="Script MT Bold" panose="03040602040607080904" pitchFamily="66" charset="0"/>
               </a:rPr>
-              <a:t>50</a:t>
+              <a:t>20</a:t>
             </a:r>
           </a:p>
         </p:txBody>
@@ -11860,7 +11852,7 @@
               <a:rPr lang="en-US" sz="3200" dirty="0">
                 <a:latin typeface="Script MT Bold" panose="03040602040607080904" pitchFamily="66" charset="0"/>
               </a:rPr>
-              <a:t>49</a:t>
+              <a:t>19</a:t>
             </a:r>
           </a:p>
           <a:p>
@@ -11868,7 +11860,7 @@
               <a:rPr lang="en-US" sz="3200" dirty="0">
                 <a:latin typeface="Script MT Bold" panose="03040602040607080904" pitchFamily="66" charset="0"/>
               </a:rPr>
-              <a:t>50</a:t>
+              <a:t>20</a:t>
             </a:r>
           </a:p>
         </p:txBody>
@@ -12884,8 +12876,25 @@
                 <a:latin typeface="Miriam Libre" panose="00000500000000000000" pitchFamily="2" charset="-79"/>
                 <a:cs typeface="Miriam Libre" panose="00000500000000000000" pitchFamily="2" charset="-79"/>
               </a:rPr>
-              <a:t>What if halfway through, you found out you only had to count to 25?</a:t>
-            </a:r>
+              <a:t>What if halfway through, you found out you only had to count </a:t>
+            </a:r>
+            <a:r>
+              <a:rPr lang="en-US" sz="2800" i="1">
+                <a:solidFill>
+                  <a:schemeClr val="tx1"/>
+                </a:solidFill>
+                <a:latin typeface="Miriam Libre" panose="00000500000000000000" pitchFamily="2" charset="-79"/>
+                <a:cs typeface="Miriam Libre" panose="00000500000000000000" pitchFamily="2" charset="-79"/>
+              </a:rPr>
+              <a:t>to 10?</a:t>
+            </a:r>
+            <a:endParaRPr lang="en-US" sz="2800" i="1" dirty="0">
+              <a:solidFill>
+                <a:schemeClr val="tx1"/>
+              </a:solidFill>
+              <a:latin typeface="Miriam Libre" panose="00000500000000000000" pitchFamily="2" charset="-79"/>
+              <a:cs typeface="Miriam Libre" panose="00000500000000000000" pitchFamily="2" charset="-79"/>
+            </a:endParaRPr>
           </a:p>
           <a:p>
             <a:endParaRPr lang="en-US" sz="2800" i="1" dirty="0">
@@ -21040,7 +21049,7 @@
 </file>
 
 <file path=ppt/slides/slide6.xml><?xml version="1.0" encoding="utf-8"?>
-<p:sld xmlns:a="http://schemas.openxmlformats.org/drawingml/2006/main" xmlns:r="http://schemas.openxmlformats.org/officeDocument/2006/relationships" xmlns:p="http://schemas.openxmlformats.org/presentationml/2006/main">
+<p:sld xmlns:a="http://schemas.openxmlformats.org/drawingml/2006/main" xmlns:r="http://schemas.openxmlformats.org/officeDocument/2006/relationships" xmlns:p="http://schemas.openxmlformats.org/presentationml/2006/main" show="0">
   <p:cSld>
     <p:spTree>
       <p:nvGrpSpPr>
@@ -21353,13 +21362,13 @@
   <p:clrMapOvr>
     <a:masterClrMapping/>
   </p:clrMapOvr>
-  <mc:AlternateContent xmlns:mc="http://schemas.openxmlformats.org/markup-compatibility/2006" xmlns:p159="http://schemas.microsoft.com/office/powerpoint/2015/09/main">
-    <mc:Choice Requires="p159">
+  <mc:AlternateContent xmlns:mc="http://schemas.openxmlformats.org/markup-compatibility/2006">
+    <mc:Choice xmlns:p159="http://schemas.microsoft.com/office/powerpoint/2015/09/main" Requires="p159">
       <p:transition xmlns:p14="http://schemas.microsoft.com/office/powerpoint/2010/main" spd="slow" p14:dur="1500">
         <p159:morph option="byObject"/>
       </p:transition>
     </mc:Choice>
-    <mc:Fallback xmlns="">
+    <mc:Fallback>
       <p:transition spd="slow">
         <p:fade/>
       </p:transition>
@@ -24401,7 +24410,7 @@
                 <a:latin typeface="Miriam Libre" panose="00000500000000000000" pitchFamily="2" charset="-79"/>
                 <a:cs typeface="Miriam Libre" panose="00000500000000000000" pitchFamily="2" charset="-79"/>
               </a:rPr>
-              <a:t>When the stopwatch starts, write out the numbers 1-50 in a vertical column – then add another column</a:t>
+              <a:t>When the stopwatch starts, write out the numbers 1-20 in a vertical column – then add another column</a:t>
             </a:r>
           </a:p>
           <a:p>
@@ -24485,7 +24494,7 @@
               <a:rPr lang="en-US" sz="3200" dirty="0">
                 <a:latin typeface="Script MT Bold" panose="03040602040607080904" pitchFamily="66" charset="0"/>
               </a:rPr>
-              <a:t>49</a:t>
+              <a:t>19</a:t>
             </a:r>
           </a:p>
           <a:p>
@@ -24493,7 +24502,7 @@
               <a:rPr lang="en-US" sz="3200" dirty="0">
                 <a:latin typeface="Script MT Bold" panose="03040602040607080904" pitchFamily="66" charset="0"/>
               </a:rPr>
-              <a:t>50</a:t>
+              <a:t>20</a:t>
             </a:r>
           </a:p>
         </p:txBody>
@@ -24562,7 +24571,7 @@
               <a:rPr lang="en-US" sz="3200" dirty="0">
                 <a:latin typeface="Script MT Bold" panose="03040602040607080904" pitchFamily="66" charset="0"/>
               </a:rPr>
-              <a:t>49</a:t>
+              <a:t>19</a:t>
             </a:r>
           </a:p>
           <a:p>
@@ -24570,7 +24579,7 @@
               <a:rPr lang="en-US" sz="3200" dirty="0">
                 <a:latin typeface="Script MT Bold" panose="03040602040607080904" pitchFamily="66" charset="0"/>
               </a:rPr>
-              <a:t>50</a:t>
+              <a:t>20</a:t>
             </a:r>
           </a:p>
         </p:txBody>

</xml_diff>

<commit_message>
Update gitbook 2025-02-04 20:46:57
</commit_message>
<xml_diff>
--- a/SoftwareDevTeamsLesson/Presentation.pptx
+++ b/SoftwareDevTeamsLesson/Presentation.pptx
@@ -31,21 +31,13 @@
       <p:regular r:id="rId17"/>
     </p:embeddedFont>
     <p:embeddedFont>
-      <p:font typeface="MingLiU" panose="02020509000000000000" pitchFamily="49" charset="-120"/>
+      <p:font typeface="Miriam Libre" panose="00000500000000000000" pitchFamily="2" charset="-79"/>
       <p:regular r:id="rId18"/>
-    </p:embeddedFont>
-    <p:embeddedFont>
-      <p:font typeface="Miriam Libre" panose="00000500000000000000" pitchFamily="2" charset="-79"/>
-      <p:regular r:id="rId19"/>
-      <p:bold r:id="rId20"/>
-    </p:embeddedFont>
-    <p:embeddedFont>
-      <p:font typeface="MS Mincho" panose="02020609040205080304" pitchFamily="49" charset="-128"/>
-      <p:regular r:id="rId21"/>
+      <p:bold r:id="rId19"/>
     </p:embeddedFont>
     <p:embeddedFont>
       <p:font typeface="Script MT Bold" panose="03040602040607080904" pitchFamily="66" charset="0"/>
-      <p:bold r:id="rId22"/>
+      <p:bold r:id="rId20"/>
     </p:embeddedFont>
   </p:embeddedFontLst>
   <p:defaultTextStyle>
@@ -11783,7 +11775,7 @@
               <a:rPr lang="en-US" sz="3200" dirty="0">
                 <a:latin typeface="Script MT Bold" panose="03040602040607080904" pitchFamily="66" charset="0"/>
               </a:rPr>
-              <a:t>49</a:t>
+              <a:t>19</a:t>
             </a:r>
           </a:p>
           <a:p>
@@ -11791,7 +11783,7 @@
               <a:rPr lang="en-US" sz="3200" dirty="0">
                 <a:latin typeface="Script MT Bold" panose="03040602040607080904" pitchFamily="66" charset="0"/>
               </a:rPr>
-              <a:t>50</a:t>
+              <a:t>20</a:t>
             </a:r>
           </a:p>
         </p:txBody>
@@ -11860,7 +11852,7 @@
               <a:rPr lang="en-US" sz="3200" dirty="0">
                 <a:latin typeface="Script MT Bold" panose="03040602040607080904" pitchFamily="66" charset="0"/>
               </a:rPr>
-              <a:t>49</a:t>
+              <a:t>19</a:t>
             </a:r>
           </a:p>
           <a:p>
@@ -11868,7 +11860,7 @@
               <a:rPr lang="en-US" sz="3200" dirty="0">
                 <a:latin typeface="Script MT Bold" panose="03040602040607080904" pitchFamily="66" charset="0"/>
               </a:rPr>
-              <a:t>50</a:t>
+              <a:t>20</a:t>
             </a:r>
           </a:p>
         </p:txBody>
@@ -12884,8 +12876,25 @@
                 <a:latin typeface="Miriam Libre" panose="00000500000000000000" pitchFamily="2" charset="-79"/>
                 <a:cs typeface="Miriam Libre" panose="00000500000000000000" pitchFamily="2" charset="-79"/>
               </a:rPr>
-              <a:t>What if halfway through, you found out you only had to count to 25?</a:t>
-            </a:r>
+              <a:t>What if halfway through, you found out you only had to count </a:t>
+            </a:r>
+            <a:r>
+              <a:rPr lang="en-US" sz="2800" i="1">
+                <a:solidFill>
+                  <a:schemeClr val="tx1"/>
+                </a:solidFill>
+                <a:latin typeface="Miriam Libre" panose="00000500000000000000" pitchFamily="2" charset="-79"/>
+                <a:cs typeface="Miriam Libre" panose="00000500000000000000" pitchFamily="2" charset="-79"/>
+              </a:rPr>
+              <a:t>to 10?</a:t>
+            </a:r>
+            <a:endParaRPr lang="en-US" sz="2800" i="1" dirty="0">
+              <a:solidFill>
+                <a:schemeClr val="tx1"/>
+              </a:solidFill>
+              <a:latin typeface="Miriam Libre" panose="00000500000000000000" pitchFamily="2" charset="-79"/>
+              <a:cs typeface="Miriam Libre" panose="00000500000000000000" pitchFamily="2" charset="-79"/>
+            </a:endParaRPr>
           </a:p>
           <a:p>
             <a:endParaRPr lang="en-US" sz="2800" i="1" dirty="0">
@@ -21040,7 +21049,7 @@
 </file>
 
 <file path=ppt/slides/slide6.xml><?xml version="1.0" encoding="utf-8"?>
-<p:sld xmlns:a="http://schemas.openxmlformats.org/drawingml/2006/main" xmlns:r="http://schemas.openxmlformats.org/officeDocument/2006/relationships" xmlns:p="http://schemas.openxmlformats.org/presentationml/2006/main">
+<p:sld xmlns:a="http://schemas.openxmlformats.org/drawingml/2006/main" xmlns:r="http://schemas.openxmlformats.org/officeDocument/2006/relationships" xmlns:p="http://schemas.openxmlformats.org/presentationml/2006/main" show="0">
   <p:cSld>
     <p:spTree>
       <p:nvGrpSpPr>
@@ -21353,13 +21362,13 @@
   <p:clrMapOvr>
     <a:masterClrMapping/>
   </p:clrMapOvr>
-  <mc:AlternateContent xmlns:mc="http://schemas.openxmlformats.org/markup-compatibility/2006" xmlns:p159="http://schemas.microsoft.com/office/powerpoint/2015/09/main">
-    <mc:Choice Requires="p159">
+  <mc:AlternateContent xmlns:mc="http://schemas.openxmlformats.org/markup-compatibility/2006">
+    <mc:Choice xmlns:p159="http://schemas.microsoft.com/office/powerpoint/2015/09/main" Requires="p159">
       <p:transition xmlns:p14="http://schemas.microsoft.com/office/powerpoint/2010/main" spd="slow" p14:dur="1500">
         <p159:morph option="byObject"/>
       </p:transition>
     </mc:Choice>
-    <mc:Fallback xmlns="">
+    <mc:Fallback>
       <p:transition spd="slow">
         <p:fade/>
       </p:transition>
@@ -24401,7 +24410,7 @@
                 <a:latin typeface="Miriam Libre" panose="00000500000000000000" pitchFamily="2" charset="-79"/>
                 <a:cs typeface="Miriam Libre" panose="00000500000000000000" pitchFamily="2" charset="-79"/>
               </a:rPr>
-              <a:t>When the stopwatch starts, write out the numbers 1-50 in a vertical column – then add another column</a:t>
+              <a:t>When the stopwatch starts, write out the numbers 1-20 in a vertical column – then add another column</a:t>
             </a:r>
           </a:p>
           <a:p>
@@ -24485,7 +24494,7 @@
               <a:rPr lang="en-US" sz="3200" dirty="0">
                 <a:latin typeface="Script MT Bold" panose="03040602040607080904" pitchFamily="66" charset="0"/>
               </a:rPr>
-              <a:t>49</a:t>
+              <a:t>19</a:t>
             </a:r>
           </a:p>
           <a:p>
@@ -24493,7 +24502,7 @@
               <a:rPr lang="en-US" sz="3200" dirty="0">
                 <a:latin typeface="Script MT Bold" panose="03040602040607080904" pitchFamily="66" charset="0"/>
               </a:rPr>
-              <a:t>50</a:t>
+              <a:t>20</a:t>
             </a:r>
           </a:p>
         </p:txBody>
@@ -24562,7 +24571,7 @@
               <a:rPr lang="en-US" sz="3200" dirty="0">
                 <a:latin typeface="Script MT Bold" panose="03040602040607080904" pitchFamily="66" charset="0"/>
               </a:rPr>
-              <a:t>49</a:t>
+              <a:t>19</a:t>
             </a:r>
           </a:p>
           <a:p>
@@ -24570,7 +24579,7 @@
               <a:rPr lang="en-US" sz="3200" dirty="0">
                 <a:latin typeface="Script MT Bold" panose="03040602040607080904" pitchFamily="66" charset="0"/>
               </a:rPr>
-              <a:t>50</a:t>
+              <a:t>20</a:t>
             </a:r>
           </a:p>
         </p:txBody>

</xml_diff>